<commit_message>
Das Ende ... ?
</commit_message>
<xml_diff>
--- a/Projektpräsentation_Gruppe_F.pptx
+++ b/Projektpräsentation_Gruppe_F.pptx
@@ -337,7 +337,7 @@
               <a:rPr lang="de-DE" smtClean="0">
                 <a:latin typeface="Lucida Sans Unicode"/>
               </a:rPr>
-              <a:t>23.06.2018</a:t>
+              <a:t>24.06.2018</a:t>
             </a:fld>
             <a:endParaRPr lang="de-DE" dirty="0">
               <a:latin typeface="Lucida Sans Unicode"/>
@@ -601,7 +601,7 @@
             </a:pPr>
             <a:fld id="{07EADA0F-24A1-4F45-AD3E-D4A03A101188}" type="datetime1">
               <a:rPr lang="de-DE" smtClean="0"/>
-              <a:t>23.06.2018</a:t>
+              <a:t>24.06.2018</a:t>
             </a:fld>
             <a:endParaRPr lang="de-DE" dirty="0"/>
           </a:p>
@@ -1019,7 +1019,7 @@
             </a:pPr>
             <a:fld id="{07EADA0F-24A1-4F45-AD3E-D4A03A101188}" type="datetime1">
               <a:rPr lang="de-DE" smtClean="0"/>
-              <a:t>23.06.2018</a:t>
+              <a:t>24.06.2018</a:t>
             </a:fld>
             <a:endParaRPr lang="de-DE" dirty="0"/>
           </a:p>
@@ -3374,8 +3374,8 @@
         </p:nvSpPr>
         <p:spPr bwMode="auto">
           <a:xfrm>
-            <a:off x="5715000" y="2"/>
-            <a:ext cx="2019300" cy="174407"/>
+            <a:off x="4788024" y="2"/>
+            <a:ext cx="2946276" cy="174407"/>
           </a:xfrm>
           <a:prstGeom prst="rect">
             <a:avLst/>
@@ -3389,7 +3389,7 @@
           </a:ln>
         </p:spPr>
         <p:txBody>
-          <a:bodyPr tIns="50800" rIns="0" bIns="0">
+          <a:bodyPr wrap="square" tIns="50800" rIns="0" bIns="0">
             <a:prstTxWarp prst="textNoShape">
               <a:avLst/>
             </a:prstTxWarp>
@@ -3412,7 +3412,7 @@
                 <a:ea typeface="ヒラギノ角ゴ Pro W3" pitchFamily="-111" charset="-128"/>
                 <a:cs typeface="ヒラギノ角ゴ Pro W3" pitchFamily="-111" charset="-128"/>
               </a:rPr>
-              <a:t> Informationsvisualisierung - Übung</a:t>
+              <a:t> Informationsvisualisierung - Masterprojekt – Gruppe F</a:t>
             </a:r>
           </a:p>
         </p:txBody>
@@ -4378,10 +4378,10 @@
       </p:sp>
       <p:pic>
         <p:nvPicPr>
-          <p:cNvPr id="2" name="Grafik 1">
+          <p:cNvPr id="3" name="Grafik 2">
             <a:extLst>
               <a:ext uri="{FF2B5EF4-FFF2-40B4-BE49-F238E27FC236}">
-                <a16:creationId xmlns:a16="http://schemas.microsoft.com/office/drawing/2014/main" id="{42C9DC78-7F9F-4A51-A503-CC689F7E89BD}"/>
+                <a16:creationId xmlns:a16="http://schemas.microsoft.com/office/drawing/2014/main" id="{CBC8AAB9-BF91-4CCA-955B-D29DECB204B8}"/>
               </a:ext>
             </a:extLst>
           </p:cNvPr>
@@ -4398,8 +4398,8 @@
         </p:blipFill>
         <p:spPr>
           <a:xfrm>
-            <a:off x="341784" y="1412776"/>
-            <a:ext cx="8460432" cy="4427515"/>
+            <a:off x="557808" y="1484784"/>
+            <a:ext cx="8028384" cy="4798214"/>
           </a:xfrm>
           <a:prstGeom prst="rect">
             <a:avLst/>
@@ -4471,10 +4471,10 @@
       </p:sp>
       <p:pic>
         <p:nvPicPr>
-          <p:cNvPr id="4" name="Grafik 3">
+          <p:cNvPr id="2" name="Grafik 1">
             <a:extLst>
               <a:ext uri="{FF2B5EF4-FFF2-40B4-BE49-F238E27FC236}">
-                <a16:creationId xmlns:a16="http://schemas.microsoft.com/office/drawing/2014/main" id="{50CA0DA2-A549-46D0-B9C0-38E06BE3195C}"/>
+                <a16:creationId xmlns:a16="http://schemas.microsoft.com/office/drawing/2014/main" id="{8BD0F5E9-E362-49BE-9919-ADE1F41989A3}"/>
               </a:ext>
             </a:extLst>
           </p:cNvPr>
@@ -4491,8 +4491,8 @@
         </p:blipFill>
         <p:spPr>
           <a:xfrm>
-            <a:off x="506398" y="1340768"/>
-            <a:ext cx="8131204" cy="4770685"/>
+            <a:off x="161764" y="1238317"/>
+            <a:ext cx="8820472" cy="5071003"/>
           </a:xfrm>
           <a:prstGeom prst="rect">
             <a:avLst/>
@@ -4564,10 +4564,10 @@
       </p:sp>
       <p:pic>
         <p:nvPicPr>
-          <p:cNvPr id="3" name="Grafik 2">
+          <p:cNvPr id="2" name="Grafik 1">
             <a:extLst>
               <a:ext uri="{FF2B5EF4-FFF2-40B4-BE49-F238E27FC236}">
-                <a16:creationId xmlns:a16="http://schemas.microsoft.com/office/drawing/2014/main" id="{90A4BFFA-C63B-4185-96AA-8EC768F374AF}"/>
+                <a16:creationId xmlns:a16="http://schemas.microsoft.com/office/drawing/2014/main" id="{5368C9BB-93DC-4AFC-AF0D-A3CDB263C079}"/>
               </a:ext>
             </a:extLst>
           </p:cNvPr>
@@ -4584,8 +4584,8 @@
         </p:blipFill>
         <p:spPr>
           <a:xfrm>
-            <a:off x="197768" y="1412776"/>
-            <a:ext cx="8748464" cy="4260481"/>
+            <a:off x="170638" y="1412776"/>
+            <a:ext cx="8802724" cy="4267988"/>
           </a:xfrm>
           <a:prstGeom prst="rect">
             <a:avLst/>
@@ -4657,10 +4657,10 @@
       </p:sp>
       <p:pic>
         <p:nvPicPr>
-          <p:cNvPr id="4" name="Grafik 3">
+          <p:cNvPr id="2" name="Grafik 1">
             <a:extLst>
               <a:ext uri="{FF2B5EF4-FFF2-40B4-BE49-F238E27FC236}">
-                <a16:creationId xmlns:a16="http://schemas.microsoft.com/office/drawing/2014/main" id="{7C706791-822C-467A-9FB1-8A031D1C92D8}"/>
+                <a16:creationId xmlns:a16="http://schemas.microsoft.com/office/drawing/2014/main" id="{8ECB672A-1F50-49F7-9DBA-FD86235F1734}"/>
               </a:ext>
             </a:extLst>
           </p:cNvPr>
@@ -4677,8 +4677,8 @@
         </p:blipFill>
         <p:spPr>
           <a:xfrm>
-            <a:off x="649463" y="1988840"/>
-            <a:ext cx="7956376" cy="2990924"/>
+            <a:off x="305780" y="1443553"/>
+            <a:ext cx="8532440" cy="3970893"/>
           </a:xfrm>
           <a:prstGeom prst="rect">
             <a:avLst/>
@@ -4881,12 +4881,14 @@
           <a:lstStyle/>
           <a:p>
             <a:r>
-              <a:rPr lang="de-DE" dirty="0" err="1"/>
-              <a:t>Bababa</a:t>
-            </a:r>
-            <a:r>
               <a:rPr lang="de-DE" dirty="0"/>
-              <a:t> aus Bericht kopieren</a:t>
+              <a:t>Falls Tool auch ohne Arzt nutzbar sein soll, dann Komponentenbezeichnungen und einblendbare Info-Hilfs-Boxen</a:t>
+            </a:r>
+          </a:p>
+          <a:p>
+            <a:r>
+              <a:rPr lang="de-DE" dirty="0"/>
+              <a:t>...</a:t>
             </a:r>
           </a:p>
         </p:txBody>
@@ -4912,7 +4914,7 @@
           <a:p>
             <a:r>
               <a:rPr lang="de-DE" dirty="0"/>
-              <a:t>Ideen für Verbesserungen</a:t>
+              <a:t>Weiterführende Ideen</a:t>
             </a:r>
           </a:p>
         </p:txBody>
@@ -4947,30 +4949,6 @@
           <a:chExt cx="0" cy="0"/>
         </a:xfrm>
       </p:grpSpPr>
-      <p:pic>
-        <p:nvPicPr>
-          <p:cNvPr id="5" name="Bild 4" descr="005_INF_004.jpg"/>
-          <p:cNvPicPr>
-            <a:picLocks noChangeAspect="1"/>
-          </p:cNvPicPr>
-          <p:nvPr/>
-        </p:nvPicPr>
-        <p:blipFill>
-          <a:blip r:embed="rId2"/>
-          <a:stretch>
-            <a:fillRect/>
-          </a:stretch>
-        </p:blipFill>
-        <p:spPr>
-          <a:xfrm>
-            <a:off x="0" y="0"/>
-            <a:ext cx="9144000" cy="6858000"/>
-          </a:xfrm>
-          <a:prstGeom prst="rect">
-            <a:avLst/>
-          </a:prstGeom>
-        </p:spPr>
-      </p:pic>
       <p:sp>
         <p:nvSpPr>
           <p:cNvPr id="9" name="Titel 8"/>
@@ -4983,7 +4961,7 @@
         </p:nvSpPr>
         <p:spPr>
           <a:xfrm>
-            <a:off x="-68262" y="1600200"/>
+            <a:off x="-68262" y="2107704"/>
             <a:ext cx="8605837" cy="457200"/>
           </a:xfrm>
         </p:spPr>
@@ -4991,14 +4969,40 @@
           <a:bodyPr/>
           <a:lstStyle/>
           <a:p>
-            <a:r>
+            <a:pPr algn="ctr"/>
+            <a:r>
+              <a:rPr lang="de-DE" dirty="0">
+                <a:solidFill>
+                  <a:schemeClr val="bg1"/>
+                </a:solidFill>
+              </a:rPr>
+              <a:t>Zeit für Praxis!</a:t>
+            </a:r>
+            <a:br>
               <a:rPr lang="de-DE" dirty="0">
                 <a:solidFill>
                   <a:srgbClr val="000000"/>
                 </a:solidFill>
               </a:rPr>
-              <a:t>Zeit für Praxis!</a:t>
-            </a:r>
+            </a:br>
+            <a:br>
+              <a:rPr lang="de-DE" dirty="0">
+                <a:solidFill>
+                  <a:srgbClr val="000000"/>
+                </a:solidFill>
+              </a:rPr>
+            </a:br>
+            <a:r>
+              <a:rPr lang="en-US" b="0" dirty="0">
+                <a:hlinkClick r:id="rId2"/>
+              </a:rPr>
+              <a:t>https://zykel.shinyapps.io/infovis_project_group_f/</a:t>
+            </a:r>
+            <a:endParaRPr lang="de-DE" dirty="0">
+              <a:solidFill>
+                <a:srgbClr val="000000"/>
+              </a:solidFill>
+            </a:endParaRPr>
           </a:p>
         </p:txBody>
       </p:sp>

</xml_diff>